<commit_message>
doc update, futurize adcclib
</commit_message>
<xml_diff>
--- a/recipe_system/docs/RecipeSystem2.pptx
+++ b/recipe_system/docs/RecipeSystem2.pptx
@@ -293,7 +293,7 @@
           <a:p>
             <a:fld id="{978E1F0D-679A-F54A-A6A8-51318776C59E}" type="datetimeFigureOut">
               <a:rPr lang="en-US" smtClean="0"/>
-              <a:t>6/24/16</a:t>
+              <a:t>1/11/17</a:t>
             </a:fld>
             <a:endParaRPr lang="en-US"/>
           </a:p>
@@ -463,7 +463,7 @@
           <a:p>
             <a:fld id="{978E1F0D-679A-F54A-A6A8-51318776C59E}" type="datetimeFigureOut">
               <a:rPr lang="en-US" smtClean="0"/>
-              <a:t>6/24/16</a:t>
+              <a:t>1/11/17</a:t>
             </a:fld>
             <a:endParaRPr lang="en-US"/>
           </a:p>
@@ -643,7 +643,7 @@
           <a:p>
             <a:fld id="{978E1F0D-679A-F54A-A6A8-51318776C59E}" type="datetimeFigureOut">
               <a:rPr lang="en-US" smtClean="0"/>
-              <a:t>6/24/16</a:t>
+              <a:t>1/11/17</a:t>
             </a:fld>
             <a:endParaRPr lang="en-US"/>
           </a:p>
@@ -813,7 +813,7 @@
           <a:p>
             <a:fld id="{978E1F0D-679A-F54A-A6A8-51318776C59E}" type="datetimeFigureOut">
               <a:rPr lang="en-US" smtClean="0"/>
-              <a:t>6/24/16</a:t>
+              <a:t>1/11/17</a:t>
             </a:fld>
             <a:endParaRPr lang="en-US"/>
           </a:p>
@@ -1059,7 +1059,7 @@
           <a:p>
             <a:fld id="{978E1F0D-679A-F54A-A6A8-51318776C59E}" type="datetimeFigureOut">
               <a:rPr lang="en-US" smtClean="0"/>
-              <a:t>6/24/16</a:t>
+              <a:t>1/11/17</a:t>
             </a:fld>
             <a:endParaRPr lang="en-US"/>
           </a:p>
@@ -1347,7 +1347,7 @@
           <a:p>
             <a:fld id="{978E1F0D-679A-F54A-A6A8-51318776C59E}" type="datetimeFigureOut">
               <a:rPr lang="en-US" smtClean="0"/>
-              <a:t>6/24/16</a:t>
+              <a:t>1/11/17</a:t>
             </a:fld>
             <a:endParaRPr lang="en-US"/>
           </a:p>
@@ -1769,7 +1769,7 @@
           <a:p>
             <a:fld id="{978E1F0D-679A-F54A-A6A8-51318776C59E}" type="datetimeFigureOut">
               <a:rPr lang="en-US" smtClean="0"/>
-              <a:t>6/24/16</a:t>
+              <a:t>1/11/17</a:t>
             </a:fld>
             <a:endParaRPr lang="en-US"/>
           </a:p>
@@ -1887,7 +1887,7 @@
           <a:p>
             <a:fld id="{978E1F0D-679A-F54A-A6A8-51318776C59E}" type="datetimeFigureOut">
               <a:rPr lang="en-US" smtClean="0"/>
-              <a:t>6/24/16</a:t>
+              <a:t>1/11/17</a:t>
             </a:fld>
             <a:endParaRPr lang="en-US"/>
           </a:p>
@@ -1982,7 +1982,7 @@
           <a:p>
             <a:fld id="{978E1F0D-679A-F54A-A6A8-51318776C59E}" type="datetimeFigureOut">
               <a:rPr lang="en-US" smtClean="0"/>
-              <a:t>6/24/16</a:t>
+              <a:t>1/11/17</a:t>
             </a:fld>
             <a:endParaRPr lang="en-US"/>
           </a:p>
@@ -2259,7 +2259,7 @@
           <a:p>
             <a:fld id="{978E1F0D-679A-F54A-A6A8-51318776C59E}" type="datetimeFigureOut">
               <a:rPr lang="en-US" smtClean="0"/>
-              <a:t>6/24/16</a:t>
+              <a:t>1/11/17</a:t>
             </a:fld>
             <a:endParaRPr lang="en-US"/>
           </a:p>
@@ -2512,7 +2512,7 @@
           <a:p>
             <a:fld id="{978E1F0D-679A-F54A-A6A8-51318776C59E}" type="datetimeFigureOut">
               <a:rPr lang="en-US" smtClean="0"/>
-              <a:t>6/24/16</a:t>
+              <a:t>1/11/17</a:t>
             </a:fld>
             <a:endParaRPr lang="en-US"/>
           </a:p>
@@ -2725,7 +2725,7 @@
           <a:p>
             <a:fld id="{978E1F0D-679A-F54A-A6A8-51318776C59E}" type="datetimeFigureOut">
               <a:rPr lang="en-US" smtClean="0"/>
-              <a:t>6/24/16</a:t>
+              <a:t>1/11/17</a:t>
             </a:fld>
             <a:endParaRPr lang="en-US"/>
           </a:p>
@@ -3158,11 +3158,7 @@
             </a:r>
             <a:r>
               <a:rPr lang="en-US" sz="1800"/>
-              <a:t>are one honking great idea -- let's do more of </a:t>
-            </a:r>
-            <a:r>
-              <a:rPr lang="en-US" sz="1800"/>
-              <a:t>those</a:t>
+              <a:t>are one honking great idea -- let's do more of those</a:t>
             </a:r>
             <a:r>
               <a:rPr lang="en-US" sz="1800" smtClean="0"/>
@@ -3280,7 +3276,7 @@
             </a:pPr>
             <a:r>
               <a:rPr lang="en-US" sz="1800" smtClean="0"/>
-              <a:t>        ‘</a:t>
+              <a:t>    ‘</a:t>
             </a:r>
             <a:r>
               <a:rPr lang="en-US" sz="1800" dirty="0" smtClean="0"/>
@@ -3288,7 +3284,7 @@
             </a:r>
             <a:r>
               <a:rPr lang="en-US" sz="1800" smtClean="0"/>
-              <a:t>cli                                 Recipe Mapper</a:t>
+              <a:t>cli                            Recipe/Primitive Mappers</a:t>
             </a:r>
             <a:endParaRPr lang="en-US" sz="1800" dirty="0" smtClean="0"/>
           </a:p>
@@ -3312,8 +3308,8 @@
         </p:nvSpPr>
         <p:spPr>
           <a:xfrm>
-            <a:off x="679555" y="692681"/>
-            <a:ext cx="541401" cy="5772355"/>
+            <a:off x="228429" y="692681"/>
+            <a:ext cx="992527" cy="5772355"/>
           </a:xfrm>
           <a:prstGeom prst="roundRect">
             <a:avLst/>
@@ -3377,119 +3373,143 @@
           <a:p>
             <a:pPr algn="ctr"/>
             <a:r>
-              <a:rPr lang="en-US" sz="1200" smtClean="0"/>
-              <a:t>RecipeMapper </a:t>
-            </a:r>
-            <a:r>
-              <a:rPr lang="en-US" sz="1200" dirty="0" smtClean="0"/>
-              <a:t>receives ‘ad’ instance of specific type, </a:t>
-            </a:r>
-            <a:r>
-              <a:rPr lang="en-US" sz="1200" dirty="0" err="1" smtClean="0"/>
-              <a:t>eg</a:t>
-            </a:r>
-            <a:r>
-              <a:rPr lang="en-US" sz="1200" dirty="0" smtClean="0"/>
-              <a:t>., </a:t>
-            </a:r>
-            <a:r>
-              <a:rPr lang="en-US" sz="1000" dirty="0" err="1" smtClean="0">
+              <a:rPr lang="en-US" sz="1200">
+                <a:solidFill>
+                  <a:schemeClr val="tx1"/>
+                </a:solidFill>
+              </a:rPr>
+              <a:t>The m</a:t>
+            </a:r>
+            <a:r>
+              <a:rPr lang="en-US" sz="1200" smtClean="0">
+                <a:solidFill>
+                  <a:schemeClr val="tx1"/>
+                </a:solidFill>
+              </a:rPr>
+              <a:t>appers </a:t>
+            </a:r>
+            <a:r>
+              <a:rPr lang="en-US" sz="1200" dirty="0" smtClean="0">
+                <a:solidFill>
+                  <a:schemeClr val="tx1"/>
+                </a:solidFill>
+              </a:rPr>
+              <a:t>receive an ‘ad’ instance providing a set of astrodata ‘tags’</a:t>
+            </a:r>
+            <a:r>
+              <a:rPr lang="en-US" sz="1000" dirty="0" smtClean="0">
+                <a:solidFill>
+                  <a:schemeClr val="tx1"/>
+                </a:solidFill>
                 <a:latin typeface="Lucida Sans Typewriter"/>
                 <a:cs typeface="Lucida Sans Typewriter"/>
               </a:rPr>
-              <a:t>astrodataGMOS</a:t>
-            </a:r>
-            <a:r>
-              <a:rPr lang="en-US" sz="1000" dirty="0" smtClean="0">
-                <a:latin typeface="Lucida Sans Typewriter"/>
-                <a:cs typeface="Lucida Sans Typewriter"/>
-              </a:rPr>
               <a:t>.</a:t>
             </a:r>
             <a:r>
-              <a:rPr lang="en-US" sz="1200" dirty="0" smtClean="0"/>
+              <a:rPr lang="en-US" sz="1200" dirty="0" smtClean="0">
+                <a:solidFill>
+                  <a:schemeClr val="tx1"/>
+                </a:solidFill>
+              </a:rPr>
               <a:t> This </a:t>
             </a:r>
             <a:r>
-              <a:rPr lang="en-US" sz="1200" smtClean="0"/>
-              <a:t>type determines </a:t>
-            </a:r>
-            <a:r>
-              <a:rPr lang="en-US" sz="1200" dirty="0" smtClean="0"/>
+              <a:rPr lang="en-US" sz="1200" smtClean="0">
+                <a:solidFill>
+                  <a:schemeClr val="tx1"/>
+                </a:solidFill>
+              </a:rPr>
+              <a:t>tag set determines </a:t>
+            </a:r>
+            <a:r>
+              <a:rPr lang="en-US" sz="1200" dirty="0" smtClean="0">
+                <a:solidFill>
+                  <a:schemeClr val="tx1"/>
+                </a:solidFill>
+              </a:rPr>
               <a:t>the </a:t>
             </a:r>
             <a:r>
-              <a:rPr lang="en-US" sz="1200" smtClean="0"/>
-              <a:t>GMOS package and imports.</a:t>
+              <a:rPr lang="en-US" sz="1200">
+                <a:solidFill>
+                  <a:schemeClr val="tx1"/>
+                </a:solidFill>
+              </a:rPr>
+              <a:t>instrument</a:t>
+            </a:r>
+            <a:r>
+              <a:rPr lang="en-US" sz="1200" smtClean="0">
+                <a:solidFill>
+                  <a:schemeClr val="tx1"/>
+                </a:solidFill>
+              </a:rPr>
+              <a:t> package, recipes, and specific primitive class; imports.</a:t>
             </a:r>
           </a:p>
           <a:p>
             <a:pPr algn="ctr"/>
-            <a:endParaRPr lang="en-US" sz="1200"/>
+            <a:r>
+              <a:rPr lang="en-US" sz="1200">
+                <a:solidFill>
+                  <a:schemeClr val="tx1"/>
+                </a:solidFill>
+              </a:rPr>
+              <a:t>Eg. (GMOS, IMAGE) in ad.tags </a:t>
+            </a:r>
+            <a:r>
+              <a:rPr lang="en-US" sz="1200">
+                <a:solidFill>
+                  <a:schemeClr val="tx1"/>
+                </a:solidFill>
+                <a:sym typeface="Wingdings"/>
+              </a:rPr>
+              <a:t></a:t>
+            </a:r>
+            <a:endParaRPr lang="en-US" sz="1200">
+              <a:solidFill>
+                <a:schemeClr val="tx1"/>
+              </a:solidFill>
+            </a:endParaRPr>
           </a:p>
           <a:p>
             <a:pPr algn="ctr"/>
             <a:r>
-              <a:rPr lang="en-US" sz="1200" smtClean="0"/>
-              <a:t> </a:t>
-            </a:r>
-            <a:r>
-              <a:rPr lang="en-US" sz="1200" dirty="0" smtClean="0"/>
-              <a:t>If no user recipe (-r), the mapper reads </a:t>
-            </a:r>
-            <a:r>
-              <a:rPr lang="en-US" sz="1200" smtClean="0"/>
-              <a:t>the package recipes, imports a </a:t>
-            </a:r>
-            <a:r>
-              <a:rPr lang="en-US" sz="1200" dirty="0" smtClean="0"/>
-              <a:t>default recipe for the specific subsets of the tag set on the ‘ad</a:t>
-            </a:r>
-            <a:r>
-              <a:rPr lang="en-US" sz="1200" smtClean="0"/>
-              <a:t>’ instance.</a:t>
-            </a:r>
+              <a:rPr lang="en-US" sz="1200">
+                <a:solidFill>
+                  <a:schemeClr val="tx1"/>
+                </a:solidFill>
+              </a:rPr>
+              <a:t>GMOS.recipes.Image</a:t>
+            </a:r>
+            <a:endParaRPr lang="en-US" sz="1200" smtClean="0">
+              <a:solidFill>
+                <a:schemeClr val="tx1"/>
+              </a:solidFill>
+            </a:endParaRPr>
           </a:p>
           <a:p>
             <a:pPr algn="ctr"/>
-            <a:r>
-              <a:rPr lang="en-US" sz="1200" smtClean="0"/>
-              <a:t>Eg. (IMAGE</a:t>
-            </a:r>
-            <a:r>
-              <a:rPr lang="en-US" sz="1200" dirty="0" smtClean="0"/>
-              <a:t>) in </a:t>
-            </a:r>
-            <a:r>
-              <a:rPr lang="en-US" sz="1200" err="1" smtClean="0"/>
-              <a:t>ad.tags</a:t>
-            </a:r>
-            <a:r>
-              <a:rPr lang="en-US" sz="1200" smtClean="0"/>
-              <a:t> </a:t>
-            </a:r>
-            <a:r>
-              <a:rPr lang="en-US" sz="1200" smtClean="0">
-                <a:sym typeface="Wingdings"/>
-              </a:rPr>
-              <a:t></a:t>
-            </a:r>
+            <a:endParaRPr lang="en-US" sz="1200">
+              <a:solidFill>
+                <a:schemeClr val="tx1"/>
+              </a:solidFill>
+            </a:endParaRPr>
           </a:p>
           <a:p>
             <a:pPr algn="ctr"/>
             <a:r>
-              <a:rPr lang="en-US" sz="1200" smtClean="0">
-                <a:sym typeface="Wingdings"/>
-              </a:rPr>
-              <a:t>GMOS.recipes.Image</a:t>
-            </a:r>
-            <a:endParaRPr lang="en-US" sz="1200" dirty="0" smtClean="0">
-              <a:sym typeface="Wingdings"/>
-            </a:endParaRPr>
-          </a:p>
-          <a:p>
-            <a:pPr algn="ctr"/>
+              <a:rPr lang="en-US" sz="1200" dirty="0" smtClean="0">
+                <a:solidFill>
+                  <a:schemeClr val="tx1"/>
+                </a:solidFill>
+              </a:rPr>
+              <a:t>A user recipe is specified recipe overrides any default recipe. </a:t>
+            </a:r>
             <a:endParaRPr lang="en-US" sz="1200" dirty="0">
+              <a:solidFill>
+                <a:schemeClr val="tx1"/>
+              </a:solidFill>
               <a:sym typeface="Wingdings"/>
             </a:endParaRPr>
           </a:p>
@@ -3530,17 +3550,29 @@
           <a:p>
             <a:pPr algn="ctr"/>
             <a:r>
-              <a:rPr lang="en-US" sz="1400" dirty="0" smtClean="0"/>
+              <a:rPr lang="en-US" sz="1400" dirty="0" smtClean="0">
+                <a:solidFill>
+                  <a:schemeClr val="tx1"/>
+                </a:solidFill>
+              </a:rPr>
               <a:t>Parameters</a:t>
             </a:r>
           </a:p>
           <a:p>
             <a:pPr algn="ctr"/>
             <a:r>
-              <a:rPr lang="en-US" sz="1400" dirty="0" smtClean="0"/>
+              <a:rPr lang="en-US" sz="1400" dirty="0" smtClean="0">
+                <a:solidFill>
+                  <a:schemeClr val="tx1"/>
+                </a:solidFill>
+              </a:rPr>
               <a:t>GMOS</a:t>
             </a:r>
-            <a:endParaRPr lang="en-US" sz="1400" dirty="0"/>
+            <a:endParaRPr lang="en-US" sz="1400" dirty="0">
+              <a:solidFill>
+                <a:schemeClr val="tx1"/>
+              </a:solidFill>
+            </a:endParaRPr>
           </a:p>
         </p:txBody>
       </p:sp>
@@ -3579,14 +3611,22 @@
           <a:p>
             <a:pPr algn="ctr"/>
             <a:r>
-              <a:rPr lang="en-US" dirty="0" smtClean="0"/>
+              <a:rPr lang="en-US" dirty="0" smtClean="0">
+                <a:solidFill>
+                  <a:schemeClr val="tx1"/>
+                </a:solidFill>
+              </a:rPr>
               <a:t>Primitives</a:t>
             </a:r>
           </a:p>
           <a:p>
             <a:pPr algn="ctr"/>
             <a:r>
-              <a:rPr lang="en-US" dirty="0" smtClean="0"/>
+              <a:rPr lang="en-US" dirty="0" smtClean="0">
+                <a:solidFill>
+                  <a:schemeClr val="tx1"/>
+                </a:solidFill>
+              </a:rPr>
               <a:t>GMOS</a:t>
             </a:r>
           </a:p>
@@ -3630,7 +3670,7 @@
         </p:nvCxnSpPr>
         <p:spPr>
           <a:xfrm>
-            <a:off x="1220956" y="2406627"/>
+            <a:off x="1220956" y="2356339"/>
             <a:ext cx="1287532" cy="0"/>
           </a:xfrm>
           <a:prstGeom prst="straightConnector1">
@@ -3642,13 +3682,13 @@
         </p:spPr>
         <p:style>
           <a:lnRef idx="2">
-            <a:schemeClr val="accent1"/>
+            <a:schemeClr val="dk1"/>
           </a:lnRef>
           <a:fillRef idx="0">
-            <a:schemeClr val="accent1"/>
+            <a:schemeClr val="dk1"/>
           </a:fillRef>
           <a:effectRef idx="1">
-            <a:schemeClr val="accent1"/>
+            <a:schemeClr val="dk1"/>
           </a:effectRef>
           <a:fontRef idx="minor">
             <a:schemeClr val="tx1"/>
@@ -3663,7 +3703,7 @@
         </p:nvSpPr>
         <p:spPr>
           <a:xfrm>
-            <a:off x="1234088" y="2689101"/>
+            <a:off x="1234088" y="2550601"/>
             <a:ext cx="1236236" cy="276999"/>
           </a:xfrm>
           <a:prstGeom prst="rect">
@@ -3727,7 +3767,7 @@
         </p:nvCxnSpPr>
         <p:spPr>
           <a:xfrm>
-            <a:off x="1220956" y="2967530"/>
+            <a:off x="1220956" y="2829030"/>
             <a:ext cx="1287532" cy="0"/>
           </a:xfrm>
           <a:prstGeom prst="straightConnector1">
@@ -3739,13 +3779,13 @@
         </p:spPr>
         <p:style>
           <a:lnRef idx="2">
-            <a:schemeClr val="accent1"/>
+            <a:schemeClr val="dk1"/>
           </a:lnRef>
           <a:fillRef idx="0">
-            <a:schemeClr val="accent1"/>
+            <a:schemeClr val="dk1"/>
           </a:fillRef>
           <a:effectRef idx="1">
-            <a:schemeClr val="accent1"/>
+            <a:schemeClr val="dk1"/>
           </a:effectRef>
           <a:fontRef idx="minor">
             <a:schemeClr val="tx1"/>
@@ -3760,7 +3800,7 @@
         </p:nvCxnSpPr>
         <p:spPr>
           <a:xfrm>
-            <a:off x="1220956" y="3510676"/>
+            <a:off x="1220956" y="3344712"/>
             <a:ext cx="1287532" cy="0"/>
           </a:xfrm>
           <a:prstGeom prst="straightConnector1">
@@ -3772,13 +3812,13 @@
         </p:spPr>
         <p:style>
           <a:lnRef idx="2">
-            <a:schemeClr val="accent1"/>
+            <a:schemeClr val="dk1"/>
           </a:lnRef>
           <a:fillRef idx="0">
-            <a:schemeClr val="accent1"/>
+            <a:schemeClr val="dk1"/>
           </a:fillRef>
           <a:effectRef idx="1">
-            <a:schemeClr val="accent1"/>
+            <a:schemeClr val="dk1"/>
           </a:effectRef>
           <a:fontRef idx="minor">
             <a:schemeClr val="tx1"/>
@@ -3793,7 +3833,7 @@
         </p:nvSpPr>
         <p:spPr>
           <a:xfrm>
-            <a:off x="1487383" y="3128675"/>
+            <a:off x="1487383" y="3044028"/>
             <a:ext cx="659155" cy="276999"/>
           </a:xfrm>
           <a:prstGeom prst="rect">
@@ -3886,14 +3926,22 @@
           <a:p>
             <a:pPr algn="ctr"/>
             <a:r>
-              <a:rPr lang="en-US" dirty="0" smtClean="0"/>
+              <a:rPr lang="en-US" dirty="0" smtClean="0">
+                <a:solidFill>
+                  <a:srgbClr val="000000"/>
+                </a:solidFill>
+              </a:rPr>
               <a:t>GMOS </a:t>
             </a:r>
           </a:p>
           <a:p>
             <a:pPr algn="ctr"/>
             <a:r>
-              <a:rPr lang="en-US" dirty="0" smtClean="0"/>
+              <a:rPr lang="en-US" dirty="0" smtClean="0">
+                <a:solidFill>
+                  <a:srgbClr val="000000"/>
+                </a:solidFill>
+              </a:rPr>
               <a:t>recipes</a:t>
             </a:r>
           </a:p>
@@ -3938,22 +3986,38 @@
           <a:p>
             <a:pPr algn="ctr"/>
             <a:r>
-              <a:rPr lang="en-US" dirty="0" smtClean="0"/>
+              <a:rPr lang="en-US" dirty="0" smtClean="0">
+                <a:solidFill>
+                  <a:srgbClr val="000000"/>
+                </a:solidFill>
+              </a:rPr>
               <a:t>GMOS </a:t>
             </a:r>
             <a:r>
-              <a:rPr lang="en-US" dirty="0" err="1" smtClean="0"/>
+              <a:rPr lang="en-US" dirty="0" err="1" smtClean="0">
+                <a:solidFill>
+                  <a:srgbClr val="000000"/>
+                </a:solidFill>
+              </a:rPr>
               <a:t>Spect</a:t>
             </a:r>
             <a:r>
-              <a:rPr lang="en-US" dirty="0" smtClean="0"/>
+              <a:rPr lang="en-US" dirty="0" smtClean="0">
+                <a:solidFill>
+                  <a:srgbClr val="000000"/>
+                </a:solidFill>
+              </a:rPr>
               <a:t> </a:t>
             </a:r>
           </a:p>
           <a:p>
             <a:pPr algn="ctr"/>
             <a:r>
-              <a:rPr lang="en-US" dirty="0" smtClean="0"/>
+              <a:rPr lang="en-US" dirty="0" smtClean="0">
+                <a:solidFill>
+                  <a:srgbClr val="000000"/>
+                </a:solidFill>
+              </a:rPr>
               <a:t>recipes</a:t>
             </a:r>
           </a:p>
@@ -3994,14 +4058,22 @@
           <a:p>
             <a:pPr algn="ctr"/>
             <a:r>
-              <a:rPr lang="en-US" dirty="0" smtClean="0"/>
+              <a:rPr lang="en-US" dirty="0" smtClean="0">
+                <a:solidFill>
+                  <a:srgbClr val="000000"/>
+                </a:solidFill>
+              </a:rPr>
               <a:t>GMOS Image </a:t>
             </a:r>
           </a:p>
           <a:p>
             <a:pPr algn="ctr"/>
             <a:r>
-              <a:rPr lang="en-US" dirty="0" smtClean="0"/>
+              <a:rPr lang="en-US" dirty="0" smtClean="0">
+                <a:solidFill>
+                  <a:srgbClr val="000000"/>
+                </a:solidFill>
+              </a:rPr>
               <a:t>recipes</a:t>
             </a:r>
           </a:p>
@@ -4118,14 +4190,22 @@
           <a:p>
             <a:pPr algn="ctr"/>
             <a:r>
-              <a:rPr lang="en-US" dirty="0" smtClean="0"/>
+              <a:rPr lang="en-US" dirty="0" smtClean="0">
+                <a:solidFill>
+                  <a:schemeClr val="tx1"/>
+                </a:solidFill>
+              </a:rPr>
               <a:t>Primitives</a:t>
             </a:r>
           </a:p>
           <a:p>
             <a:pPr algn="ctr"/>
             <a:r>
-              <a:rPr lang="en-US" dirty="0" smtClean="0"/>
+              <a:rPr lang="en-US" dirty="0" smtClean="0">
+                <a:solidFill>
+                  <a:schemeClr val="tx1"/>
+                </a:solidFill>
+              </a:rPr>
               <a:t>GMOS Image</a:t>
             </a:r>
           </a:p>
@@ -4166,21 +4246,37 @@
           <a:p>
             <a:pPr algn="ctr"/>
             <a:r>
-              <a:rPr lang="en-US" dirty="0" smtClean="0"/>
+              <a:rPr lang="en-US" dirty="0" smtClean="0">
+                <a:solidFill>
+                  <a:srgbClr val="000000"/>
+                </a:solidFill>
+              </a:rPr>
               <a:t>Primitives</a:t>
             </a:r>
           </a:p>
           <a:p>
             <a:pPr algn="ctr"/>
             <a:r>
-              <a:rPr lang="en-US" dirty="0" smtClean="0"/>
+              <a:rPr lang="en-US" dirty="0" smtClean="0">
+                <a:solidFill>
+                  <a:srgbClr val="000000"/>
+                </a:solidFill>
+              </a:rPr>
               <a:t>GMOS </a:t>
             </a:r>
             <a:r>
-              <a:rPr lang="en-US" dirty="0" err="1" smtClean="0"/>
+              <a:rPr lang="en-US" dirty="0" err="1" smtClean="0">
+                <a:solidFill>
+                  <a:srgbClr val="000000"/>
+                </a:solidFill>
+              </a:rPr>
               <a:t>Spect</a:t>
             </a:r>
-            <a:endParaRPr lang="en-US" dirty="0" smtClean="0"/>
+            <a:endParaRPr lang="en-US" dirty="0" smtClean="0">
+              <a:solidFill>
+                <a:srgbClr val="000000"/>
+              </a:solidFill>
+            </a:endParaRPr>
           </a:p>
         </p:txBody>
       </p:sp>
@@ -4293,6 +4389,288 @@
               <a:rPr lang="en-US" smtClean="0"/>
               <a:t>package</a:t>
             </a:r>
+            <a:endParaRPr lang="en-US"/>
+          </a:p>
+        </p:txBody>
+      </p:sp>
+      <p:cxnSp>
+        <p:nvCxnSpPr>
+          <p:cNvPr id="25" name="Straight Arrow Connector 24"/>
+          <p:cNvCxnSpPr/>
+          <p:nvPr/>
+        </p:nvCxnSpPr>
+        <p:spPr>
+          <a:xfrm rot="10800000">
+            <a:off x="1220956" y="4974473"/>
+            <a:ext cx="1287532" cy="0"/>
+          </a:xfrm>
+          <a:prstGeom prst="straightConnector1">
+            <a:avLst/>
+          </a:prstGeom>
+          <a:ln>
+            <a:tailEnd type="arrow"/>
+          </a:ln>
+        </p:spPr>
+        <p:style>
+          <a:lnRef idx="2">
+            <a:schemeClr val="dk1"/>
+          </a:lnRef>
+          <a:fillRef idx="0">
+            <a:schemeClr val="dk1"/>
+          </a:fillRef>
+          <a:effectRef idx="1">
+            <a:schemeClr val="dk1"/>
+          </a:effectRef>
+          <a:fontRef idx="minor">
+            <a:schemeClr val="tx1"/>
+          </a:fontRef>
+        </p:style>
+      </p:cxnSp>
+      <p:cxnSp>
+        <p:nvCxnSpPr>
+          <p:cNvPr id="26" name="Straight Arrow Connector 25"/>
+          <p:cNvCxnSpPr/>
+          <p:nvPr/>
+        </p:nvCxnSpPr>
+        <p:spPr>
+          <a:xfrm rot="10800000">
+            <a:off x="1220956" y="4409341"/>
+            <a:ext cx="1287532" cy="0"/>
+          </a:xfrm>
+          <a:prstGeom prst="straightConnector1">
+            <a:avLst/>
+          </a:prstGeom>
+          <a:ln>
+            <a:tailEnd type="arrow"/>
+          </a:ln>
+        </p:spPr>
+        <p:style>
+          <a:lnRef idx="2">
+            <a:schemeClr val="dk1"/>
+          </a:lnRef>
+          <a:fillRef idx="0">
+            <a:schemeClr val="dk1"/>
+          </a:fillRef>
+          <a:effectRef idx="1">
+            <a:schemeClr val="dk1"/>
+          </a:effectRef>
+          <a:fontRef idx="minor">
+            <a:schemeClr val="tx1"/>
+          </a:fontRef>
+        </p:style>
+      </p:cxnSp>
+      <p:sp>
+        <p:nvSpPr>
+          <p:cNvPr id="11" name="TextBox 10"/>
+          <p:cNvSpPr txBox="1"/>
+          <p:nvPr/>
+        </p:nvSpPr>
+        <p:spPr>
+          <a:xfrm>
+            <a:off x="1234088" y="4057896"/>
+            <a:ext cx="1302084" cy="276999"/>
+          </a:xfrm>
+          <a:prstGeom prst="rect">
+            <a:avLst/>
+          </a:prstGeom>
+          <a:noFill/>
+        </p:spPr>
+        <p:txBody>
+          <a:bodyPr wrap="none" rtlCol="0">
+            <a:spAutoFit/>
+          </a:bodyPr>
+          <a:lstStyle/>
+          <a:p>
+            <a:r>
+              <a:rPr lang="en-US" sz="1200"/>
+              <a:t>Primitive instance</a:t>
+            </a:r>
+          </a:p>
+        </p:txBody>
+      </p:sp>
+      <p:sp>
+        <p:nvSpPr>
+          <p:cNvPr id="30" name="TextBox 29"/>
+          <p:cNvSpPr txBox="1"/>
+          <p:nvPr/>
+        </p:nvSpPr>
+        <p:spPr>
+          <a:xfrm>
+            <a:off x="1311458" y="4605141"/>
+            <a:ext cx="1158866" cy="276999"/>
+          </a:xfrm>
+          <a:prstGeom prst="rect">
+            <a:avLst/>
+          </a:prstGeom>
+          <a:noFill/>
+        </p:spPr>
+        <p:txBody>
+          <a:bodyPr wrap="none" rtlCol="0">
+            <a:spAutoFit/>
+          </a:bodyPr>
+          <a:lstStyle/>
+          <a:p>
+            <a:r>
+              <a:rPr lang="en-US" sz="1200"/>
+              <a:t>Recipe function</a:t>
+            </a:r>
+          </a:p>
+        </p:txBody>
+      </p:sp>
+      <p:sp>
+        <p:nvSpPr>
+          <p:cNvPr id="31" name="TextBox 30"/>
+          <p:cNvSpPr txBox="1"/>
+          <p:nvPr/>
+        </p:nvSpPr>
+        <p:spPr>
+          <a:xfrm>
+            <a:off x="228429" y="4235809"/>
+            <a:ext cx="951475" cy="276999"/>
+          </a:xfrm>
+          <a:prstGeom prst="rect">
+            <a:avLst/>
+          </a:prstGeom>
+          <a:noFill/>
+        </p:spPr>
+        <p:txBody>
+          <a:bodyPr wrap="square" rtlCol="0">
+            <a:spAutoFit/>
+          </a:bodyPr>
+          <a:lstStyle/>
+          <a:p>
+            <a:r>
+              <a:rPr lang="en-US" sz="1200"/>
+              <a:t>Primitive, p</a:t>
+            </a:r>
+          </a:p>
+        </p:txBody>
+      </p:sp>
+      <p:sp>
+        <p:nvSpPr>
+          <p:cNvPr id="32" name="TextBox 31"/>
+          <p:cNvSpPr txBox="1"/>
+          <p:nvPr/>
+        </p:nvSpPr>
+        <p:spPr>
+          <a:xfrm>
+            <a:off x="269481" y="4697474"/>
+            <a:ext cx="951475" cy="276999"/>
+          </a:xfrm>
+          <a:prstGeom prst="rect">
+            <a:avLst/>
+          </a:prstGeom>
+          <a:noFill/>
+        </p:spPr>
+        <p:txBody>
+          <a:bodyPr wrap="square" rtlCol="0">
+            <a:spAutoFit/>
+          </a:bodyPr>
+          <a:lstStyle/>
+          <a:p>
+            <a:r>
+              <a:rPr lang="en-US" sz="1200"/>
+              <a:t>recipe(p)</a:t>
+            </a:r>
+          </a:p>
+        </p:txBody>
+      </p:sp>
+      <p:cxnSp>
+        <p:nvCxnSpPr>
+          <p:cNvPr id="13" name="Straight Arrow Connector 12"/>
+          <p:cNvCxnSpPr/>
+          <p:nvPr/>
+        </p:nvCxnSpPr>
+        <p:spPr>
+          <a:xfrm>
+            <a:off x="667011" y="4449256"/>
+            <a:ext cx="0" cy="320336"/>
+          </a:xfrm>
+          <a:prstGeom prst="straightConnector1">
+            <a:avLst/>
+          </a:prstGeom>
+          <a:ln>
+            <a:tailEnd type="arrow"/>
+          </a:ln>
+        </p:spPr>
+        <p:style>
+          <a:lnRef idx="2">
+            <a:schemeClr val="dk1"/>
+          </a:lnRef>
+          <a:fillRef idx="0">
+            <a:schemeClr val="dk1"/>
+          </a:fillRef>
+          <a:effectRef idx="1">
+            <a:schemeClr val="dk1"/>
+          </a:effectRef>
+          <a:fontRef idx="minor">
+            <a:schemeClr val="tx1"/>
+          </a:fontRef>
+        </p:style>
+      </p:cxnSp>
+      <p:sp>
+        <p:nvSpPr>
+          <p:cNvPr id="37" name="TextBox 36"/>
+          <p:cNvSpPr txBox="1"/>
+          <p:nvPr/>
+        </p:nvSpPr>
+        <p:spPr>
+          <a:xfrm>
+            <a:off x="319799" y="2685712"/>
+            <a:ext cx="694423" cy="276999"/>
+          </a:xfrm>
+          <a:prstGeom prst="rect">
+            <a:avLst/>
+          </a:prstGeom>
+          <a:noFill/>
+        </p:spPr>
+        <p:txBody>
+          <a:bodyPr wrap="square" rtlCol="0">
+            <a:spAutoFit/>
+          </a:bodyPr>
+          <a:lstStyle/>
+          <a:p>
+            <a:r>
+              <a:rPr lang="en-US" sz="1200"/>
+              <a:t>   args</a:t>
+            </a:r>
+          </a:p>
+        </p:txBody>
+      </p:sp>
+      <p:sp>
+        <p:nvSpPr>
+          <p:cNvPr id="17" name="Left Brace 16"/>
+          <p:cNvSpPr/>
+          <p:nvPr/>
+        </p:nvSpPr>
+        <p:spPr>
+          <a:xfrm>
+            <a:off x="796663" y="2356339"/>
+            <a:ext cx="355828" cy="964688"/>
+          </a:xfrm>
+          <a:prstGeom prst="leftBrace">
+            <a:avLst/>
+          </a:prstGeom>
+        </p:spPr>
+        <p:style>
+          <a:lnRef idx="2">
+            <a:schemeClr val="dk1"/>
+          </a:lnRef>
+          <a:fillRef idx="0">
+            <a:schemeClr val="dk1"/>
+          </a:fillRef>
+          <a:effectRef idx="1">
+            <a:schemeClr val="dk1"/>
+          </a:effectRef>
+          <a:fontRef idx="minor">
+            <a:schemeClr val="tx1"/>
+          </a:fontRef>
+        </p:style>
+        <p:txBody>
+          <a:bodyPr rtlCol="0" anchor="ctr"/>
+          <a:lstStyle/>
+          <a:p>
+            <a:pPr algn="ctr"/>
             <a:endParaRPr lang="en-US"/>
           </a:p>
         </p:txBody>
@@ -5961,15 +6339,7 @@
             </a:pPr>
             <a:r>
               <a:rPr lang="en-US" sz="1400" smtClean="0"/>
-              <a:t>Here is a short demonstration of a </a:t>
-            </a:r>
-            <a:r>
-              <a:rPr lang="en-US" sz="1400" smtClean="0"/>
-              <a:t>prototype </a:t>
-            </a:r>
-            <a:r>
-              <a:rPr lang="en-US" sz="1400" smtClean="0"/>
-              <a:t>RecipeMapper class. This is fairly simple-minded at this level, but serves to illustrate the use of the class. The RecipeMapper class receives an ‘ad’ instance, and may receive a recipe name (recipename=), a context (context=),  and a set of user parameters (uparms=). These would be passed in by the `reduce` command line, or other programmatic interface. A default recipe and context are set if none are passed. In concert with the now pythonic instrument packages, it is noted that this RecipeMapper class comprises 55 lines of code, and essentially replaces the entirety of the RecipeLibrary (720 lines), the ReductionObject (664 lines), and ReductionContext (1600 lines) classes. It is anticipated that a more sophisticated RecipeMapper class will necessarily expand to implement more requirements than are currently satifisfied by this prototype.</a:t>
+              <a:t>Here is a short demonstration of a prototype RecipeMapper class. This is fairly simple-minded at this level, but serves to illustrate the use of the class. The RecipeMapper class receives an ‘ad’ instance, and may receive a recipe name (recipename=), a context (context=),  and a set of user parameters (uparms=). These would be passed in by the `reduce` command line, or other programmatic interface. A default recipe and context are set if none are passed. In concert with the now pythonic instrument packages, it is noted that this RecipeMapper class comprises 55 lines of code, and essentially replaces the entirety of the RecipeLibrary (720 lines), the ReductionObject (664 lines), and ReductionContext (1600 lines) classes. It is anticipated that a more sophisticated RecipeMapper class will necessarily expand to implement more requirements than are currently satifisfied by this prototype.</a:t>
             </a:r>
           </a:p>
           <a:p>
@@ -6390,11 +6760,7 @@
             </a:r>
             <a:r>
               <a:rPr lang="en-US" sz="1000"/>
-              <a:t>= rm.get_recipe_actual</a:t>
-            </a:r>
-            <a:r>
-              <a:rPr lang="en-US" sz="1000"/>
-              <a:t>(</a:t>
+              <a:t>= rm.get_recipe_actual(</a:t>
             </a:r>
             <a:r>
               <a:rPr lang="en-US" sz="1000" smtClean="0"/>
@@ -6459,11 +6825,7 @@
             </a:pPr>
             <a:r>
               <a:rPr lang="en-US" sz="1000"/>
-              <a:t>    </a:t>
-            </a:r>
-            <a:r>
-              <a:rPr lang="en-US" sz="1000"/>
-              <a:t> </a:t>
+              <a:t>     </a:t>
             </a:r>
             <a:r>
               <a:rPr lang="en-US" sz="1000" smtClean="0"/>

</xml_diff>